<commit_message>
Remove unnecessary checks and rework buzzing time
</commit_message>
<xml_diff>
--- a/Presentation.pptx
+++ b/Presentation.pptx
@@ -22,39 +22,43 @@
   <p:notesSz cx="6858000" cy="9144000"/>
   <p:embeddedFontLst>
     <p:embeddedFont>
-      <p:font typeface="Calibri" panose="020F0502020204030204" pitchFamily="34" charset="0"/>
+      <p:font typeface="Anton" pitchFamily="2" charset="0"/>
       <p:regular r:id="rId12"/>
-      <p:bold r:id="rId13"/>
-      <p:italic r:id="rId14"/>
-      <p:boldItalic r:id="rId15"/>
     </p:embeddedFont>
     <p:embeddedFont>
-      <p:font typeface="Lato" panose="020B0604020202020204" pitchFamily="34" charset="0"/>
-      <p:regular r:id="rId16"/>
-      <p:bold r:id="rId17"/>
-      <p:italic r:id="rId18"/>
-      <p:boldItalic r:id="rId19"/>
+      <p:font typeface="Calibri" panose="020F0502020204030204" pitchFamily="34" charset="0"/>
+      <p:regular r:id="rId13"/>
+      <p:bold r:id="rId14"/>
+      <p:italic r:id="rId15"/>
+      <p:boldItalic r:id="rId16"/>
     </p:embeddedFont>
     <p:embeddedFont>
-      <p:font typeface="Roboto" panose="020B0604020202020204" pitchFamily="2" charset="0"/>
-      <p:regular r:id="rId20"/>
-      <p:bold r:id="rId21"/>
-      <p:italic r:id="rId22"/>
-      <p:boldItalic r:id="rId23"/>
+      <p:font typeface="Lato" panose="020F0502020204030203" pitchFamily="34" charset="0"/>
+      <p:regular r:id="rId17"/>
+      <p:bold r:id="rId18"/>
+      <p:italic r:id="rId19"/>
+      <p:boldItalic r:id="rId20"/>
     </p:embeddedFont>
     <p:embeddedFont>
-      <p:font typeface="Roboto Mono" panose="020B0604020202020204" pitchFamily="49" charset="0"/>
-      <p:regular r:id="rId24"/>
-      <p:bold r:id="rId25"/>
-      <p:italic r:id="rId26"/>
-      <p:boldItalic r:id="rId27"/>
+      <p:font typeface="Roboto" panose="02000000000000000000" pitchFamily="2" charset="0"/>
+      <p:regular r:id="rId21"/>
+      <p:bold r:id="rId22"/>
+      <p:italic r:id="rId23"/>
+      <p:boldItalic r:id="rId24"/>
     </p:embeddedFont>
     <p:embeddedFont>
-      <p:font typeface="Roboto Mono Medium" panose="020B0604020202020204" pitchFamily="49" charset="0"/>
-      <p:regular r:id="rId28"/>
-      <p:bold r:id="rId29"/>
-      <p:italic r:id="rId30"/>
-      <p:boldItalic r:id="rId31"/>
+      <p:font typeface="Roboto Mono" panose="00000009000000000000" pitchFamily="49" charset="0"/>
+      <p:regular r:id="rId25"/>
+      <p:bold r:id="rId26"/>
+      <p:italic r:id="rId27"/>
+      <p:boldItalic r:id="rId28"/>
+    </p:embeddedFont>
+    <p:embeddedFont>
+      <p:font typeface="Roboto Mono Medium" panose="00000009000000000000" pitchFamily="49" charset="0"/>
+      <p:regular r:id="rId29"/>
+      <p:bold r:id="rId30"/>
+      <p:italic r:id="rId31"/>
+      <p:boldItalic r:id="rId32"/>
     </p:embeddedFont>
   </p:embeddedFontLst>
   <p:defaultTextStyle>
@@ -20849,7 +20853,7 @@
         </p:nvSpPr>
         <p:spPr>
           <a:xfrm>
-            <a:off x="720000" y="540000"/>
+            <a:off x="720000" y="564106"/>
             <a:ext cx="7704000" cy="477600"/>
           </a:xfrm>
           <a:prstGeom prst="rect">
@@ -20867,7 +20871,7 @@
                 <a:spcPts val="0"/>
               </a:spcBef>
               <a:spcAft>
-                <a:spcPts val="0"/>
+                <a:spcPts val="1600"/>
               </a:spcAft>
               <a:buNone/>
             </a:pPr>
@@ -20895,7 +20899,7 @@
         </p:nvSpPr>
         <p:spPr>
           <a:xfrm>
-            <a:off x="701749" y="1227609"/>
+            <a:off x="937492" y="1256184"/>
             <a:ext cx="7722251" cy="1756596"/>
           </a:xfrm>
           <a:prstGeom prst="rect">
@@ -20913,6 +20917,9 @@
           <a:lstStyle/>
           <a:p>
             <a:pPr marL="342900" lvl="0" indent="-342900">
+              <a:spcAft>
+                <a:spcPts val="1600"/>
+              </a:spcAft>
               <a:buClr>
                 <a:schemeClr val="tx1"/>
               </a:buClr>
@@ -20920,7 +20927,7 @@
               <a:buAutoNum type="arabicPeriod"/>
             </a:pPr>
             <a:r>
-              <a:rPr lang="ru-RU" sz="1600" b="1">
+              <a:rPr lang="ru-RU" sz="1600" b="1" dirty="0">
                 <a:solidFill>
                   <a:schemeClr val="tx1"/>
                 </a:solidFill>
@@ -20934,6 +20941,9 @@
           </a:p>
           <a:p>
             <a:pPr marL="342900" lvl="0" indent="-342900">
+              <a:spcAft>
+                <a:spcPts val="1600"/>
+              </a:spcAft>
               <a:buClr>
                 <a:schemeClr val="tx1"/>
               </a:buClr>
@@ -20941,7 +20951,7 @@
               <a:buAutoNum type="arabicPeriod"/>
             </a:pPr>
             <a:r>
-              <a:rPr lang="ru-RU" sz="1600" b="1">
+              <a:rPr lang="ru-RU" sz="1600" b="1" dirty="0">
                 <a:solidFill>
                   <a:schemeClr val="tx1"/>
                 </a:solidFill>
@@ -20955,6 +20965,9 @@
           </a:p>
           <a:p>
             <a:pPr marL="342900" lvl="0" indent="-342900">
+              <a:spcAft>
+                <a:spcPts val="1600"/>
+              </a:spcAft>
               <a:buClr>
                 <a:schemeClr val="tx1"/>
               </a:buClr>
@@ -20962,7 +20975,7 @@
               <a:buAutoNum type="arabicPeriod"/>
             </a:pPr>
             <a:r>
-              <a:rPr lang="ru-RU" sz="1600" b="1">
+              <a:rPr lang="ru-RU" sz="1600" b="1" dirty="0">
                 <a:solidFill>
                   <a:schemeClr val="tx1"/>
                 </a:solidFill>
@@ -20976,6 +20989,9 @@
           </a:p>
           <a:p>
             <a:pPr marL="342900" lvl="0" indent="-342900">
+              <a:spcAft>
+                <a:spcPts val="1600"/>
+              </a:spcAft>
               <a:buClr>
                 <a:schemeClr val="tx1"/>
               </a:buClr>
@@ -20983,7 +20999,7 @@
               <a:buAutoNum type="arabicPeriod"/>
             </a:pPr>
             <a:r>
-              <a:rPr lang="ru-RU" sz="1600" b="1">
+              <a:rPr lang="ru-RU" sz="1600" b="1" dirty="0">
                 <a:solidFill>
                   <a:schemeClr val="tx1"/>
                 </a:solidFill>
@@ -20997,6 +21013,9 @@
           </a:p>
           <a:p>
             <a:pPr marL="342900" lvl="0" indent="-342900">
+              <a:spcAft>
+                <a:spcPts val="1600"/>
+              </a:spcAft>
               <a:buClr>
                 <a:schemeClr val="tx1"/>
               </a:buClr>
@@ -21004,7 +21023,7 @@
               <a:buAutoNum type="arabicPeriod"/>
             </a:pPr>
             <a:r>
-              <a:rPr lang="ru-RU" sz="1600" b="1">
+              <a:rPr lang="ru-RU" sz="1600" b="1" dirty="0">
                 <a:solidFill>
                   <a:schemeClr val="tx1"/>
                 </a:solidFill>
@@ -21018,6 +21037,9 @@
           </a:p>
           <a:p>
             <a:pPr marL="342900" lvl="0" indent="-342900">
+              <a:spcAft>
+                <a:spcPts val="1600"/>
+              </a:spcAft>
               <a:buClr>
                 <a:schemeClr val="tx1"/>
               </a:buClr>
@@ -21025,7 +21047,7 @@
               <a:buAutoNum type="arabicPeriod"/>
             </a:pPr>
             <a:r>
-              <a:rPr lang="ru-RU" sz="1600" b="1">
+              <a:rPr lang="ru-RU" sz="1600" b="1" dirty="0">
                 <a:solidFill>
                   <a:schemeClr val="tx1"/>
                 </a:solidFill>
@@ -21428,26 +21450,32 @@
           <a:lstStyle/>
           <a:p>
             <a:pPr algn="just">
+              <a:spcAft>
+                <a:spcPts val="600"/>
+              </a:spcAft>
               <a:buClr>
                 <a:schemeClr val="tx1"/>
               </a:buClr>
             </a:pPr>
             <a:r>
-              <a:rPr lang="bg-BG" sz="1600">
+              <a:rPr lang="bg-BG" sz="1600" dirty="0">
                 <a:solidFill>
                   <a:schemeClr val="tx1"/>
                 </a:solidFill>
               </a:rPr>
-              <a:t>В началото на кода се заделя памет за променливите и масивите. След това в setup функцията се инизиализират определените пинове като вход и изход. В loop метода конвертира дистанцията в сантиметри. След това започват проверките за дистанцията на обекта от сензора. При различни дистанции се включват различни светлини и има различен звук от buzzer-а. През цялото време на LCD екрана се показва дистанцията в сантиметри.</a:t>
+              <a:t>В началото на кода се заделя памет за променливите и масивите. След това в setup функцията се инизиализират определените пинове като вход и изход. В loop метода конвертира дистанцията в сантиметри. След това започват проверките за дистанцията на обекта от сензора. При различни дистанции се включват различни светлини и има различен звук от говорителя. Когато има обект в обхвата на сензора на LCD екрана се показва дистанцията в сантиметри до този обект.</a:t>
             </a:r>
           </a:p>
           <a:p>
             <a:pPr lvl="0">
+              <a:spcAft>
+                <a:spcPts val="600"/>
+              </a:spcAft>
               <a:buClr>
                 <a:schemeClr val="tx1"/>
               </a:buClr>
             </a:pPr>
-            <a:endParaRPr lang="ru-RU" sz="1600" b="1">
+            <a:endParaRPr lang="ru-RU" sz="1600" b="1" dirty="0">
               <a:solidFill>
                 <a:schemeClr val="tx1"/>
               </a:solidFill>
@@ -21544,14 +21572,16 @@
           <p:nvPr/>
         </p:nvPicPr>
         <p:blipFill>
-          <a:blip r:embed="rId3"/>
+          <a:blip r:embed="rId3">
+            <a:alphaModFix/>
+          </a:blip>
           <a:stretch>
             <a:fillRect/>
           </a:stretch>
         </p:blipFill>
         <p:spPr>
           <a:xfrm>
-            <a:off x="2005389" y="1145191"/>
+            <a:off x="1933951" y="1060131"/>
             <a:ext cx="5133222" cy="3711814"/>
           </a:xfrm>
           <a:prstGeom prst="rect">
@@ -21610,7 +21640,7 @@
           <a:lstStyle/>
           <a:p>
             <a:r>
-              <a:rPr lang="bg-BG"/>
+              <a:rPr lang="bg-BG" dirty="0"/>
               <a:t>Списък със съставни части</a:t>
             </a:r>
           </a:p>
@@ -21630,8 +21660,8 @@
         </p:nvSpPr>
         <p:spPr>
           <a:xfrm>
-            <a:off x="0" y="1376086"/>
-            <a:ext cx="9144000" cy="2862322"/>
+            <a:off x="885825" y="1326079"/>
+            <a:ext cx="8043863" cy="3208571"/>
           </a:xfrm>
           <a:prstGeom prst="rect">
             <a:avLst/>
@@ -21643,9 +21673,15 @@
           </a:bodyPr>
           <a:lstStyle/>
           <a:p>
-            <a:pPr algn="ctr"/>
+            <a:pPr marL="285750" indent="-285750">
+              <a:spcAft>
+                <a:spcPts val="300"/>
+              </a:spcAft>
+              <a:buFont typeface="Arial" panose="020B0604020202020204" pitchFamily="34" charset="0"/>
+              <a:buChar char="•"/>
+            </a:pPr>
             <a:r>
-              <a:rPr lang="en-US" sz="1800">
+              <a:rPr lang="en-US" sz="1800" dirty="0">
                 <a:solidFill>
                   <a:schemeClr val="tx1"/>
                 </a:solidFill>
@@ -21654,9 +21690,15 @@
             </a:r>
           </a:p>
           <a:p>
-            <a:pPr algn="ctr"/>
+            <a:pPr marL="285750" indent="-285750">
+              <a:spcAft>
+                <a:spcPts val="300"/>
+              </a:spcAft>
+              <a:buFont typeface="Arial" panose="020B0604020202020204" pitchFamily="34" charset="0"/>
+              <a:buChar char="•"/>
+            </a:pPr>
             <a:r>
-              <a:rPr lang="en-US" sz="1800">
+              <a:rPr lang="en-US" sz="1800" dirty="0">
                 <a:solidFill>
                   <a:schemeClr val="tx1"/>
                 </a:solidFill>
@@ -21665,9 +21707,15 @@
             </a:r>
           </a:p>
           <a:p>
-            <a:pPr algn="ctr"/>
+            <a:pPr marL="285750" indent="-285750">
+              <a:spcAft>
+                <a:spcPts val="300"/>
+              </a:spcAft>
+              <a:buFont typeface="Arial" panose="020B0604020202020204" pitchFamily="34" charset="0"/>
+              <a:buChar char="•"/>
+            </a:pPr>
             <a:r>
-              <a:rPr lang="en-US" sz="1800">
+              <a:rPr lang="en-US" sz="1800" dirty="0">
                 <a:solidFill>
                   <a:schemeClr val="tx1"/>
                 </a:solidFill>
@@ -21676,9 +21724,15 @@
             </a:r>
           </a:p>
           <a:p>
-            <a:pPr algn="ctr"/>
+            <a:pPr marL="285750" indent="-285750">
+              <a:spcAft>
+                <a:spcPts val="300"/>
+              </a:spcAft>
+              <a:buFont typeface="Arial" panose="020B0604020202020204" pitchFamily="34" charset="0"/>
+              <a:buChar char="•"/>
+            </a:pPr>
             <a:r>
-              <a:rPr lang="en-US" sz="1800">
+              <a:rPr lang="en-US" sz="1800" dirty="0">
                 <a:solidFill>
                   <a:schemeClr val="tx1"/>
                 </a:solidFill>
@@ -21687,9 +21741,15 @@
             </a:r>
           </a:p>
           <a:p>
-            <a:pPr algn="ctr"/>
+            <a:pPr marL="285750" indent="-285750">
+              <a:spcAft>
+                <a:spcPts val="300"/>
+              </a:spcAft>
+              <a:buFont typeface="Arial" panose="020B0604020202020204" pitchFamily="34" charset="0"/>
+              <a:buChar char="•"/>
+            </a:pPr>
             <a:r>
-              <a:rPr lang="en-US" sz="1800">
+              <a:rPr lang="en-US" sz="1800" dirty="0">
                 <a:solidFill>
                   <a:schemeClr val="tx1"/>
                 </a:solidFill>
@@ -21697,7 +21757,7 @@
               <a:t>3 x 330 </a:t>
             </a:r>
             <a:r>
-              <a:rPr lang="el-GR" sz="1800">
+              <a:rPr lang="el-GR" sz="1800" dirty="0">
                 <a:solidFill>
                   <a:schemeClr val="tx1"/>
                 </a:solidFill>
@@ -21705,7 +21765,7 @@
               <a:t>Ω </a:t>
             </a:r>
             <a:r>
-              <a:rPr lang="en-US" sz="1800">
+              <a:rPr lang="en-US" sz="1800" dirty="0">
                 <a:solidFill>
                   <a:schemeClr val="tx1"/>
                 </a:solidFill>
@@ -21714,9 +21774,15 @@
             </a:r>
           </a:p>
           <a:p>
-            <a:pPr algn="ctr"/>
+            <a:pPr marL="285750" indent="-285750">
+              <a:spcAft>
+                <a:spcPts val="300"/>
+              </a:spcAft>
+              <a:buFont typeface="Arial" panose="020B0604020202020204" pitchFamily="34" charset="0"/>
+              <a:buChar char="•"/>
+            </a:pPr>
             <a:r>
-              <a:rPr lang="en-US" sz="1800">
+              <a:rPr lang="en-US" sz="1800" dirty="0">
                 <a:solidFill>
                   <a:schemeClr val="tx1"/>
                 </a:solidFill>
@@ -21725,9 +21791,15 @@
             </a:r>
           </a:p>
           <a:p>
-            <a:pPr algn="ctr"/>
+            <a:pPr marL="285750" indent="-285750">
+              <a:spcAft>
+                <a:spcPts val="300"/>
+              </a:spcAft>
+              <a:buFont typeface="Arial" panose="020B0604020202020204" pitchFamily="34" charset="0"/>
+              <a:buChar char="•"/>
+            </a:pPr>
             <a:r>
-              <a:rPr lang="en-US" sz="1800">
+              <a:rPr lang="en-US" sz="1800" dirty="0">
                 <a:solidFill>
                   <a:schemeClr val="tx1"/>
                 </a:solidFill>
@@ -21735,7 +21807,7 @@
               <a:t>100 </a:t>
             </a:r>
             <a:r>
-              <a:rPr lang="el-GR" sz="1800">
+              <a:rPr lang="el-GR" sz="1800" dirty="0">
                 <a:solidFill>
                   <a:schemeClr val="tx1"/>
                 </a:solidFill>
@@ -21743,7 +21815,7 @@
               <a:t>Ω </a:t>
             </a:r>
             <a:r>
-              <a:rPr lang="en-US" sz="1800">
+              <a:rPr lang="en-US" sz="1800" dirty="0">
                 <a:solidFill>
                   <a:schemeClr val="tx1"/>
                 </a:solidFill>
@@ -21752,9 +21824,15 @@
             </a:r>
           </a:p>
           <a:p>
-            <a:pPr algn="ctr"/>
+            <a:pPr marL="285750" indent="-285750">
+              <a:spcAft>
+                <a:spcPts val="300"/>
+              </a:spcAft>
+              <a:buFont typeface="Arial" panose="020B0604020202020204" pitchFamily="34" charset="0"/>
+              <a:buChar char="•"/>
+            </a:pPr>
             <a:r>
-              <a:rPr lang="en-US" sz="1800">
+              <a:rPr lang="en-US" sz="1800" dirty="0">
                 <a:solidFill>
                   <a:schemeClr val="tx1"/>
                 </a:solidFill>
@@ -21763,9 +21841,15 @@
             </a:r>
           </a:p>
           <a:p>
-            <a:pPr algn="ctr"/>
+            <a:pPr marL="285750" indent="-285750">
+              <a:spcAft>
+                <a:spcPts val="300"/>
+              </a:spcAft>
+              <a:buFont typeface="Arial" panose="020B0604020202020204" pitchFamily="34" charset="0"/>
+              <a:buChar char="•"/>
+            </a:pPr>
             <a:r>
-              <a:rPr lang="en-US" sz="1800">
+              <a:rPr lang="en-US" sz="1800" dirty="0">
                 <a:solidFill>
                   <a:schemeClr val="tx1"/>
                 </a:solidFill>
@@ -21773,7 +21857,7 @@
               <a:t>220 </a:t>
             </a:r>
             <a:r>
-              <a:rPr lang="el-GR" sz="1800">
+              <a:rPr lang="el-GR" sz="1800" dirty="0">
                 <a:solidFill>
                   <a:schemeClr val="tx1"/>
                 </a:solidFill>
@@ -21781,7 +21865,7 @@
               <a:t>Ω </a:t>
             </a:r>
             <a:r>
-              <a:rPr lang="en-US" sz="1800">
+              <a:rPr lang="en-US" sz="1800" dirty="0">
                 <a:solidFill>
                   <a:schemeClr val="tx1"/>
                 </a:solidFill>
@@ -21790,9 +21874,15 @@
             </a:r>
           </a:p>
           <a:p>
-            <a:pPr algn="ctr"/>
+            <a:pPr marL="285750" indent="-285750">
+              <a:spcAft>
+                <a:spcPts val="300"/>
+              </a:spcAft>
+              <a:buFont typeface="Arial" panose="020B0604020202020204" pitchFamily="34" charset="0"/>
+              <a:buChar char="•"/>
+            </a:pPr>
             <a:r>
-              <a:rPr lang="en-US" sz="1800">
+              <a:rPr lang="en-US" sz="1800" dirty="0">
                 <a:solidFill>
                   <a:schemeClr val="tx1"/>
                 </a:solidFill>
@@ -22400,14 +22490,14 @@
           <p:nvPr>
             <p:extLst>
               <p:ext uri="{D42A27DB-BD31-4B8C-83A1-F6EECF244321}">
-                <p14:modId xmlns:p14="http://schemas.microsoft.com/office/powerpoint/2010/main" val="2628320101"/>
+                <p14:modId xmlns:p14="http://schemas.microsoft.com/office/powerpoint/2010/main" val="994128016"/>
               </p:ext>
             </p:extLst>
           </p:nvPr>
         </p:nvGraphicFramePr>
         <p:xfrm>
-          <a:off x="4871230" y="1744606"/>
-          <a:ext cx="914400" cy="792163"/>
+          <a:off x="4870450" y="1730375"/>
+          <a:ext cx="914400" cy="792162"/>
         </p:xfrm>
         <a:graphic>
           <a:graphicData uri="http://schemas.openxmlformats.org/presentationml/2006/ole">
@@ -22434,8 +22524,8 @@
                     </p:blipFill>
                     <p:spPr>
                       <a:xfrm>
-                        <a:off x="4871230" y="1744606"/>
-                        <a:ext cx="914400" cy="792163"/>
+                        <a:off x="4870450" y="1730375"/>
+                        <a:ext cx="914400" cy="792162"/>
                       </a:xfrm>
                       <a:prstGeom prst="rect">
                         <a:avLst/>
@@ -22707,23 +22797,23 @@
           <a:p>
             <a:pPr marL="0" indent="0" algn="just"/>
             <a:r>
-              <a:rPr lang="bg-BG" sz="1800"/>
-              <a:t>Проектът има много възможности за употреба, както и за парктроник, така и за доста други неща. Ако потребителят реши може да махне екрана и да има „пазител за шкаф“ или да премахне </a:t>
+              <a:rPr lang="bg-BG" sz="1800" dirty="0"/>
+              <a:t>Проектът има много възможности за употреба, както и за парктроник, така и за доста други неща. Ако потребителят реши може да премахне екрана и да има „пазител за шкаф“ или да премахне светлодиодите</a:t>
             </a:r>
             <a:r>
-              <a:rPr lang="en-US" sz="1800"/>
-              <a:t>LED </a:t>
+              <a:rPr lang="en-US" sz="1800" dirty="0"/>
+              <a:t> </a:t>
             </a:r>
             <a:r>
-              <a:rPr lang="bg-BG" sz="1800"/>
-              <a:t>и </a:t>
+              <a:rPr lang="bg-BG" sz="1800" dirty="0"/>
+              <a:t>и говорителя</a:t>
             </a:r>
             <a:r>
-              <a:rPr lang="en-US" sz="1800"/>
-              <a:t>buzzer-a </a:t>
+              <a:rPr lang="en-US" sz="1800" dirty="0"/>
+              <a:t> </a:t>
             </a:r>
             <a:r>
-              <a:rPr lang="bg-BG" sz="1800"/>
+              <a:rPr lang="bg-BG" sz="1800" dirty="0"/>
               <a:t>и ще получи уред за измерване на дистанция.</a:t>
             </a:r>
           </a:p>
@@ -22737,7 +22827,7 @@
               </a:spcAft>
               <a:buNone/>
             </a:pPr>
-            <a:endParaRPr sz="1800"/>
+            <a:endParaRPr sz="1800" dirty="0"/>
           </a:p>
         </p:txBody>
       </p:sp>
@@ -22925,14 +23015,14 @@
               <a:buNone/>
             </a:pPr>
             <a:r>
-              <a:rPr lang="bg-BG" sz="5400">
+              <a:rPr lang="bg-BG" sz="5400" dirty="0">
                 <a:solidFill>
                   <a:schemeClr val="tx1"/>
                 </a:solidFill>
               </a:rPr>
               <a:t>Благодаря за вниманието!</a:t>
             </a:r>
-            <a:endParaRPr sz="5400">
+            <a:endParaRPr sz="5400" dirty="0">
               <a:solidFill>
                 <a:schemeClr val="tx1"/>
               </a:solidFill>
@@ -23296,7 +23386,7 @@
         </p:nvSpPr>
         <p:spPr>
           <a:xfrm>
-            <a:off x="2827050" y="2493900"/>
+            <a:off x="2827049" y="2470950"/>
             <a:ext cx="201600" cy="201600"/>
           </a:xfrm>
           <a:prstGeom prst="ellipse">

</xml_diff>